<commit_message>
Minor modifications made; added via upload
</commit_message>
<xml_diff>
--- a/SOTU Ontology.pptx
+++ b/SOTU Ontology.pptx
@@ -3403,9 +3403,7 @@
             <a:avLst/>
           </a:prstGeom>
           <a:solidFill>
-            <a:schemeClr val="bg1">
-              <a:lumMod val="85000"/>
-            </a:schemeClr>
+            <a:srgbClr val="FF0000"/>
           </a:solidFill>
         </p:spPr>
         <p:style>
@@ -4470,9 +4468,7 @@
             <a:prstGeom prst="roundRect">
               <a:avLst/>
             </a:prstGeom>
-            <a:solidFill>
-              <a:srgbClr val="FF0000"/>
-            </a:solidFill>
+            <a:noFill/>
           </p:spPr>
           <p:style>
             <a:lnRef idx="2">
@@ -5240,9 +5236,7 @@
             <a:avLst/>
           </a:prstGeom>
           <a:solidFill>
-            <a:schemeClr val="bg1">
-              <a:lumMod val="85000"/>
-            </a:schemeClr>
+            <a:srgbClr val="FF0000"/>
           </a:solidFill>
         </p:spPr>
         <p:style>
@@ -5298,9 +5292,7 @@
             <a:avLst/>
           </a:prstGeom>
           <a:solidFill>
-            <a:schemeClr val="bg1">
-              <a:lumMod val="85000"/>
-            </a:schemeClr>
+            <a:srgbClr val="FF0000"/>
           </a:solidFill>
         </p:spPr>
         <p:style>
@@ -5494,7 +5486,11 @@
           <a:prstGeom prst="roundRect">
             <a:avLst/>
           </a:prstGeom>
-          <a:noFill/>
+          <a:solidFill>
+            <a:schemeClr val="bg1">
+              <a:lumMod val="85000"/>
+            </a:schemeClr>
+          </a:solidFill>
         </p:spPr>
         <p:style>
           <a:lnRef idx="2">
@@ -5548,7 +5544,11 @@
           <a:prstGeom prst="roundRect">
             <a:avLst/>
           </a:prstGeom>
-          <a:noFill/>
+          <a:solidFill>
+            <a:schemeClr val="bg1">
+              <a:lumMod val="85000"/>
+            </a:schemeClr>
+          </a:solidFill>
         </p:spPr>
         <p:style>
           <a:lnRef idx="2">
@@ -5602,7 +5602,11 @@
           <a:prstGeom prst="roundRect">
             <a:avLst/>
           </a:prstGeom>
-          <a:noFill/>
+          <a:solidFill>
+            <a:schemeClr val="bg1">
+              <a:lumMod val="85000"/>
+            </a:schemeClr>
+          </a:solidFill>
         </p:spPr>
         <p:style>
           <a:lnRef idx="2">
@@ -5656,7 +5660,11 @@
           <a:prstGeom prst="roundRect">
             <a:avLst/>
           </a:prstGeom>
-          <a:noFill/>
+          <a:solidFill>
+            <a:schemeClr val="bg1">
+              <a:lumMod val="85000"/>
+            </a:schemeClr>
+          </a:solidFill>
         </p:spPr>
         <p:style>
           <a:lnRef idx="2">
@@ -6186,7 +6194,11 @@
           <a:prstGeom prst="roundRect">
             <a:avLst/>
           </a:prstGeom>
-          <a:noFill/>
+          <a:solidFill>
+            <a:schemeClr val="bg1">
+              <a:lumMod val="85000"/>
+            </a:schemeClr>
+          </a:solidFill>
         </p:spPr>
         <p:style>
           <a:lnRef idx="2">
@@ -6240,7 +6252,11 @@
           <a:prstGeom prst="roundRect">
             <a:avLst/>
           </a:prstGeom>
-          <a:noFill/>
+          <a:solidFill>
+            <a:schemeClr val="bg1">
+              <a:lumMod val="85000"/>
+            </a:schemeClr>
+          </a:solidFill>
         </p:spPr>
         <p:style>
           <a:lnRef idx="2">
@@ -6901,7 +6917,9 @@
           <a:prstGeom prst="roundRect">
             <a:avLst/>
           </a:prstGeom>
-          <a:noFill/>
+          <a:solidFill>
+            <a:srgbClr val="FF0000"/>
+          </a:solidFill>
         </p:spPr>
         <p:style>
           <a:lnRef idx="2">
@@ -7050,7 +7068,11 @@
           <a:prstGeom prst="roundRect">
             <a:avLst/>
           </a:prstGeom>
-          <a:noFill/>
+          <a:solidFill>
+            <a:schemeClr val="bg1">
+              <a:lumMod val="85000"/>
+            </a:schemeClr>
+          </a:solidFill>
         </p:spPr>
         <p:style>
           <a:lnRef idx="2">
@@ -7104,7 +7126,11 @@
           <a:prstGeom prst="roundRect">
             <a:avLst/>
           </a:prstGeom>
-          <a:noFill/>
+          <a:solidFill>
+            <a:schemeClr val="bg1">
+              <a:lumMod val="85000"/>
+            </a:schemeClr>
+          </a:solidFill>
         </p:spPr>
         <p:style>
           <a:lnRef idx="2">
@@ -7158,7 +7184,11 @@
           <a:prstGeom prst="roundRect">
             <a:avLst/>
           </a:prstGeom>
-          <a:noFill/>
+          <a:solidFill>
+            <a:schemeClr val="bg1">
+              <a:lumMod val="85000"/>
+            </a:schemeClr>
+          </a:solidFill>
         </p:spPr>
         <p:style>
           <a:lnRef idx="2">
@@ -7212,7 +7242,11 @@
           <a:prstGeom prst="roundRect">
             <a:avLst/>
           </a:prstGeom>
-          <a:noFill/>
+          <a:solidFill>
+            <a:schemeClr val="bg1">
+              <a:lumMod val="85000"/>
+            </a:schemeClr>
+          </a:solidFill>
         </p:spPr>
         <p:style>
           <a:lnRef idx="2">
@@ -7266,7 +7300,11 @@
           <a:prstGeom prst="roundRect">
             <a:avLst/>
           </a:prstGeom>
-          <a:noFill/>
+          <a:solidFill>
+            <a:schemeClr val="bg1">
+              <a:lumMod val="85000"/>
+            </a:schemeClr>
+          </a:solidFill>
         </p:spPr>
         <p:style>
           <a:lnRef idx="2">
@@ -7320,7 +7358,11 @@
           <a:prstGeom prst="roundRect">
             <a:avLst/>
           </a:prstGeom>
-          <a:noFill/>
+          <a:solidFill>
+            <a:schemeClr val="bg1">
+              <a:lumMod val="85000"/>
+            </a:schemeClr>
+          </a:solidFill>
         </p:spPr>
         <p:style>
           <a:lnRef idx="2">
@@ -7701,7 +7743,11 @@
           <a:prstGeom prst="roundRect">
             <a:avLst/>
           </a:prstGeom>
-          <a:noFill/>
+          <a:solidFill>
+            <a:schemeClr val="bg1">
+              <a:lumMod val="85000"/>
+            </a:schemeClr>
+          </a:solidFill>
         </p:spPr>
         <p:style>
           <a:lnRef idx="2">
@@ -7755,7 +7801,11 @@
           <a:prstGeom prst="roundRect">
             <a:avLst/>
           </a:prstGeom>
-          <a:noFill/>
+          <a:solidFill>
+            <a:schemeClr val="bg1">
+              <a:lumMod val="85000"/>
+            </a:schemeClr>
+          </a:solidFill>
         </p:spPr>
         <p:style>
           <a:lnRef idx="2">
@@ -7809,7 +7859,11 @@
           <a:prstGeom prst="roundRect">
             <a:avLst/>
           </a:prstGeom>
-          <a:noFill/>
+          <a:solidFill>
+            <a:schemeClr val="bg1">
+              <a:lumMod val="85000"/>
+            </a:schemeClr>
+          </a:solidFill>
         </p:spPr>
         <p:style>
           <a:lnRef idx="2">
@@ -7863,7 +7917,11 @@
           <a:prstGeom prst="roundRect">
             <a:avLst/>
           </a:prstGeom>
-          <a:noFill/>
+          <a:solidFill>
+            <a:schemeClr val="bg1">
+              <a:lumMod val="85000"/>
+            </a:schemeClr>
+          </a:solidFill>
         </p:spPr>
         <p:style>
           <a:lnRef idx="2">
@@ -7917,7 +7975,11 @@
           <a:prstGeom prst="roundRect">
             <a:avLst/>
           </a:prstGeom>
-          <a:noFill/>
+          <a:solidFill>
+            <a:schemeClr val="bg1">
+              <a:lumMod val="85000"/>
+            </a:schemeClr>
+          </a:solidFill>
         </p:spPr>
         <p:style>
           <a:lnRef idx="2">
@@ -7971,7 +8033,11 @@
           <a:prstGeom prst="roundRect">
             <a:avLst/>
           </a:prstGeom>
-          <a:noFill/>
+          <a:solidFill>
+            <a:schemeClr val="bg1">
+              <a:lumMod val="85000"/>
+            </a:schemeClr>
+          </a:solidFill>
         </p:spPr>
         <p:style>
           <a:lnRef idx="2">

</xml_diff>